<commit_message>
new levels and presentation, documentation
</commit_message>
<xml_diff>
--- a/TowerDefence.pptx
+++ b/TowerDefence.pptx
@@ -7,9 +7,10 @@
   <p:sldIdLst>
     <p:sldId id="256" r:id="rId2"/>
     <p:sldId id="260" r:id="rId3"/>
-    <p:sldId id="257" r:id="rId4"/>
-    <p:sldId id="258" r:id="rId5"/>
-    <p:sldId id="259" r:id="rId6"/>
+    <p:sldId id="261" r:id="rId4"/>
+    <p:sldId id="257" r:id="rId5"/>
+    <p:sldId id="258" r:id="rId6"/>
+    <p:sldId id="259" r:id="rId7"/>
   </p:sldIdLst>
   <p:sldSz cx="10080625" cy="5670550"/>
   <p:notesSz cx="7559675" cy="10691813"/>
@@ -108,6 +109,11 @@
       </a:defRPr>
     </a:lvl9pPr>
   </p:defaultTextStyle>
+  <p:extLst>
+    <p:ext uri="{EFAFB233-063F-42B5-8137-9DF3F51BA10A}">
+      <p15:sldGuideLst xmlns:p15="http://schemas.microsoft.com/office/powerpoint/2012/main"/>
+    </p:ext>
+  </p:extLst>
 </p:presentation>
 </file>
 
@@ -2186,10 +2192,16 @@
           <a:p>
             <a:pPr algn="ctr"/>
             <a:r>
-              <a:rPr lang="ru-RU" dirty="0" smtClean="0"/>
+              <a:rPr lang="ru-RU" dirty="0" smtClean="0">
+                <a:latin typeface="Times New Roman" panose="02020603050405020304" pitchFamily="18" charset="0"/>
+                <a:cs typeface="Times New Roman" panose="02020603050405020304" pitchFamily="18" charset="0"/>
+              </a:rPr>
               <a:t>Меню</a:t>
             </a:r>
-            <a:endParaRPr lang="ru-RU" dirty="0"/>
+            <a:endParaRPr lang="ru-RU" dirty="0">
+              <a:latin typeface="Times New Roman" panose="02020603050405020304" pitchFamily="18" charset="0"/>
+              <a:cs typeface="Times New Roman" panose="02020603050405020304" pitchFamily="18" charset="0"/>
+            </a:endParaRPr>
           </a:p>
         </p:txBody>
       </p:sp>
@@ -2209,8 +2221,8 @@
         </p:blipFill>
         <p:spPr>
           <a:xfrm>
-            <a:off x="2355039" y="1340883"/>
-            <a:ext cx="5369202" cy="3702755"/>
+            <a:off x="2243970" y="1316607"/>
+            <a:ext cx="5591340" cy="3855948"/>
           </a:xfrm>
           <a:prstGeom prst="rect">
             <a:avLst/>
@@ -2266,6 +2278,95 @@
         </p:nvSpPr>
         <p:spPr>
           <a:xfrm>
+            <a:off x="504000" y="394601"/>
+            <a:ext cx="9071280" cy="609398"/>
+          </a:xfrm>
+        </p:spPr>
+        <p:txBody>
+          <a:bodyPr/>
+          <a:lstStyle/>
+          <a:p>
+            <a:pPr algn="ctr"/>
+            <a:r>
+              <a:rPr lang="ru-RU" dirty="0" smtClean="0">
+                <a:latin typeface="Times New Roman" panose="02020603050405020304" pitchFamily="18" charset="0"/>
+                <a:cs typeface="Times New Roman" panose="02020603050405020304" pitchFamily="18" charset="0"/>
+              </a:rPr>
+              <a:t>Уровни</a:t>
+            </a:r>
+            <a:endParaRPr lang="ru-RU" dirty="0">
+              <a:latin typeface="Times New Roman" panose="02020603050405020304" pitchFamily="18" charset="0"/>
+              <a:cs typeface="Times New Roman" panose="02020603050405020304" pitchFamily="18" charset="0"/>
+            </a:endParaRPr>
+          </a:p>
+        </p:txBody>
+      </p:sp>
+      <p:pic>
+        <p:nvPicPr>
+          <p:cNvPr id="6" name="Рисунок 5"/>
+          <p:cNvPicPr>
+            <a:picLocks noChangeAspect="1"/>
+          </p:cNvPicPr>
+          <p:nvPr/>
+        </p:nvPicPr>
+        <p:blipFill>
+          <a:blip r:embed="rId2"/>
+          <a:stretch>
+            <a:fillRect/>
+          </a:stretch>
+        </p:blipFill>
+        <p:spPr>
+          <a:xfrm>
+            <a:off x="2288223" y="1371041"/>
+            <a:ext cx="5502833" cy="3801102"/>
+          </a:xfrm>
+          <a:prstGeom prst="rect">
+            <a:avLst/>
+          </a:prstGeom>
+        </p:spPr>
+      </p:pic>
+    </p:spTree>
+    <p:extLst>
+      <p:ext uri="{BB962C8B-B14F-4D97-AF65-F5344CB8AC3E}">
+        <p14:creationId xmlns:p14="http://schemas.microsoft.com/office/powerpoint/2010/main" val="1973914910"/>
+      </p:ext>
+    </p:extLst>
+  </p:cSld>
+  <p:clrMapOvr>
+    <a:masterClrMapping/>
+  </p:clrMapOvr>
+</p:sld>
+</file>
+
+<file path=ppt/slides/slide4.xml><?xml version="1.0" encoding="utf-8"?>
+<p:sld xmlns:a="http://schemas.openxmlformats.org/drawingml/2006/main" xmlns:r="http://schemas.openxmlformats.org/officeDocument/2006/relationships" xmlns:p="http://schemas.openxmlformats.org/presentationml/2006/main">
+  <p:cSld>
+    <p:spTree>
+      <p:nvGrpSpPr>
+        <p:cNvPr id="1" name=""/>
+        <p:cNvGrpSpPr/>
+        <p:nvPr/>
+      </p:nvGrpSpPr>
+      <p:grpSpPr>
+        <a:xfrm>
+          <a:off x="0" y="0"/>
+          <a:ext cx="0" cy="0"/>
+          <a:chOff x="0" y="0"/>
+          <a:chExt cx="0" cy="0"/>
+        </a:xfrm>
+      </p:grpSpPr>
+      <p:sp>
+        <p:nvSpPr>
+          <p:cNvPr id="2" name="Заголовок 1"/>
+          <p:cNvSpPr>
+            <a:spLocks noGrp="1"/>
+          </p:cNvSpPr>
+          <p:nvPr>
+            <p:ph type="title"/>
+          </p:nvPr>
+        </p:nvSpPr>
+        <p:spPr>
+          <a:xfrm>
             <a:off x="613188" y="685519"/>
             <a:ext cx="9071280" cy="609398"/>
           </a:xfrm>
@@ -2609,7 +2710,7 @@
 </p:sld>
 </file>
 
-<file path=ppt/slides/slide4.xml><?xml version="1.0" encoding="utf-8"?>
+<file path=ppt/slides/slide5.xml><?xml version="1.0" encoding="utf-8"?>
 <p:sld xmlns:a="http://schemas.openxmlformats.org/drawingml/2006/main" xmlns:r="http://schemas.openxmlformats.org/officeDocument/2006/relationships" xmlns:p="http://schemas.openxmlformats.org/presentationml/2006/main">
   <p:cSld>
     <p:spTree>
@@ -3041,7 +3142,7 @@
 </p:sld>
 </file>
 
-<file path=ppt/slides/slide5.xml><?xml version="1.0" encoding="utf-8"?>
+<file path=ppt/slides/slide6.xml><?xml version="1.0" encoding="utf-8"?>
 <p:sld xmlns:a="http://schemas.openxmlformats.org/drawingml/2006/main" xmlns:r="http://schemas.openxmlformats.org/officeDocument/2006/relationships" xmlns:p="http://schemas.openxmlformats.org/presentationml/2006/main">
   <p:cSld>
     <p:spTree>

</xml_diff>